<commit_message>
updating the buffer PEO figure to the crazy truth
</commit_message>
<xml_diff>
--- a/proposal/PMC_patterns/buffer_PEO_LPO.pptx
+++ b/proposal/PMC_patterns/buffer_PEO_LPO.pptx
@@ -288,7 +288,7 @@
           <a:p>
             <a:fld id="{27F542A0-29CF-4F0A-BD37-6F29BDCFB731}" type="datetimeFigureOut">
               <a:rPr lang="en-US" smtClean="0"/>
-              <a:t>7/14/2013</a:t>
+              <a:t>7/16/2013</a:t>
             </a:fld>
             <a:endParaRPr lang="en-US"/>
           </a:p>
@@ -458,7 +458,7 @@
           <a:p>
             <a:fld id="{27F542A0-29CF-4F0A-BD37-6F29BDCFB731}" type="datetimeFigureOut">
               <a:rPr lang="en-US" smtClean="0"/>
-              <a:t>7/14/2013</a:t>
+              <a:t>7/16/2013</a:t>
             </a:fld>
             <a:endParaRPr lang="en-US"/>
           </a:p>
@@ -638,7 +638,7 @@
           <a:p>
             <a:fld id="{27F542A0-29CF-4F0A-BD37-6F29BDCFB731}" type="datetimeFigureOut">
               <a:rPr lang="en-US" smtClean="0"/>
-              <a:t>7/14/2013</a:t>
+              <a:t>7/16/2013</a:t>
             </a:fld>
             <a:endParaRPr lang="en-US"/>
           </a:p>
@@ -808,7 +808,7 @@
           <a:p>
             <a:fld id="{27F542A0-29CF-4F0A-BD37-6F29BDCFB731}" type="datetimeFigureOut">
               <a:rPr lang="en-US" smtClean="0"/>
-              <a:t>7/14/2013</a:t>
+              <a:t>7/16/2013</a:t>
             </a:fld>
             <a:endParaRPr lang="en-US"/>
           </a:p>
@@ -1054,7 +1054,7 @@
           <a:p>
             <a:fld id="{27F542A0-29CF-4F0A-BD37-6F29BDCFB731}" type="datetimeFigureOut">
               <a:rPr lang="en-US" smtClean="0"/>
-              <a:t>7/14/2013</a:t>
+              <a:t>7/16/2013</a:t>
             </a:fld>
             <a:endParaRPr lang="en-US"/>
           </a:p>
@@ -1342,7 +1342,7 @@
           <a:p>
             <a:fld id="{27F542A0-29CF-4F0A-BD37-6F29BDCFB731}" type="datetimeFigureOut">
               <a:rPr lang="en-US" smtClean="0"/>
-              <a:t>7/14/2013</a:t>
+              <a:t>7/16/2013</a:t>
             </a:fld>
             <a:endParaRPr lang="en-US"/>
           </a:p>
@@ -1764,7 +1764,7 @@
           <a:p>
             <a:fld id="{27F542A0-29CF-4F0A-BD37-6F29BDCFB731}" type="datetimeFigureOut">
               <a:rPr lang="en-US" smtClean="0"/>
-              <a:t>7/14/2013</a:t>
+              <a:t>7/16/2013</a:t>
             </a:fld>
             <a:endParaRPr lang="en-US"/>
           </a:p>
@@ -1882,7 +1882,7 @@
           <a:p>
             <a:fld id="{27F542A0-29CF-4F0A-BD37-6F29BDCFB731}" type="datetimeFigureOut">
               <a:rPr lang="en-US" smtClean="0"/>
-              <a:t>7/14/2013</a:t>
+              <a:t>7/16/2013</a:t>
             </a:fld>
             <a:endParaRPr lang="en-US"/>
           </a:p>
@@ -1977,7 +1977,7 @@
           <a:p>
             <a:fld id="{27F542A0-29CF-4F0A-BD37-6F29BDCFB731}" type="datetimeFigureOut">
               <a:rPr lang="en-US" smtClean="0"/>
-              <a:t>7/14/2013</a:t>
+              <a:t>7/16/2013</a:t>
             </a:fld>
             <a:endParaRPr lang="en-US"/>
           </a:p>
@@ -2254,7 +2254,7 @@
           <a:p>
             <a:fld id="{27F542A0-29CF-4F0A-BD37-6F29BDCFB731}" type="datetimeFigureOut">
               <a:rPr lang="en-US" smtClean="0"/>
-              <a:t>7/14/2013</a:t>
+              <a:t>7/16/2013</a:t>
             </a:fld>
             <a:endParaRPr lang="en-US"/>
           </a:p>
@@ -2507,7 +2507,7 @@
           <a:p>
             <a:fld id="{27F542A0-29CF-4F0A-BD37-6F29BDCFB731}" type="datetimeFigureOut">
               <a:rPr lang="en-US" smtClean="0"/>
-              <a:t>7/14/2013</a:t>
+              <a:t>7/16/2013</a:t>
             </a:fld>
             <a:endParaRPr lang="en-US"/>
           </a:p>
@@ -2720,7 +2720,7 @@
           <a:p>
             <a:fld id="{27F542A0-29CF-4F0A-BD37-6F29BDCFB731}" type="datetimeFigureOut">
               <a:rPr lang="en-US" smtClean="0"/>
-              <a:t>7/14/2013</a:t>
+              <a:t>7/16/2013</a:t>
             </a:fld>
             <a:endParaRPr lang="en-US"/>
           </a:p>
@@ -3831,6 +3831,7 @@
             <a:solidFill>
               <a:schemeClr val="tx1"/>
             </a:solidFill>
+            <a:prstDash val="dash"/>
             <a:tailEnd type="arrow"/>
           </a:ln>
         </p:spPr>
@@ -3870,6 +3871,7 @@
             <a:solidFill>
               <a:schemeClr val="tx1"/>
             </a:solidFill>
+            <a:prstDash val="dash"/>
             <a:tailEnd type="arrow"/>
           </a:ln>
         </p:spPr>
@@ -3909,6 +3911,7 @@
             <a:solidFill>
               <a:schemeClr val="tx1"/>
             </a:solidFill>
+            <a:prstDash val="dash"/>
             <a:tailEnd type="arrow"/>
           </a:ln>
         </p:spPr>
@@ -4828,6 +4831,82 @@
           </a:p>
         </p:txBody>
       </p:sp>
+      <p:cxnSp>
+        <p:nvCxnSpPr>
+          <p:cNvPr id="49" name="Straight Arrow Connector 48"/>
+          <p:cNvCxnSpPr>
+            <a:stCxn id="37" idx="3"/>
+            <a:endCxn id="75" idx="1"/>
+          </p:cNvCxnSpPr>
+          <p:nvPr/>
+        </p:nvCxnSpPr>
+        <p:spPr>
+          <a:xfrm>
+            <a:off x="2820489" y="3652853"/>
+            <a:ext cx="3002280" cy="0"/>
+          </a:xfrm>
+          <a:prstGeom prst="straightConnector1">
+            <a:avLst/>
+          </a:prstGeom>
+          <a:ln w="50800">
+            <a:solidFill>
+              <a:schemeClr val="tx1"/>
+            </a:solidFill>
+            <a:prstDash val="solid"/>
+            <a:tailEnd type="arrow"/>
+          </a:ln>
+        </p:spPr>
+        <p:style>
+          <a:lnRef idx="1">
+            <a:schemeClr val="accent1"/>
+          </a:lnRef>
+          <a:fillRef idx="0">
+            <a:schemeClr val="accent1"/>
+          </a:fillRef>
+          <a:effectRef idx="0">
+            <a:schemeClr val="accent1"/>
+          </a:effectRef>
+          <a:fontRef idx="minor">
+            <a:schemeClr val="tx1"/>
+          </a:fontRef>
+        </p:style>
+      </p:cxnSp>
+      <p:cxnSp>
+        <p:nvCxnSpPr>
+          <p:cNvPr id="53" name="Straight Arrow Connector 52"/>
+          <p:cNvCxnSpPr/>
+          <p:nvPr/>
+        </p:nvCxnSpPr>
+        <p:spPr>
+          <a:xfrm>
+            <a:off x="4523740" y="5572052"/>
+            <a:ext cx="3464723" cy="0"/>
+          </a:xfrm>
+          <a:prstGeom prst="straightConnector1">
+            <a:avLst/>
+          </a:prstGeom>
+          <a:ln w="50800">
+            <a:solidFill>
+              <a:schemeClr val="tx1"/>
+            </a:solidFill>
+            <a:tailEnd type="arrow"/>
+          </a:ln>
+        </p:spPr>
+        <p:style>
+          <a:lnRef idx="1">
+            <a:schemeClr val="accent1"/>
+          </a:lnRef>
+          <a:fillRef idx="0">
+            <a:schemeClr val="accent1"/>
+          </a:fillRef>
+          <a:effectRef idx="0">
+            <a:schemeClr val="accent1"/>
+          </a:effectRef>
+          <a:fontRef idx="minor">
+            <a:schemeClr val="tx1"/>
+          </a:fontRef>
+        </p:style>
+      </p:cxnSp>
     </p:spTree>
     <p:extLst>
       <p:ext uri="{BB962C8B-B14F-4D97-AF65-F5344CB8AC3E}">

</xml_diff>